<commit_message>
Final Edit To Presentation
</commit_message>
<xml_diff>
--- a/docs/Presentation.pptx
+++ b/docs/Presentation.pptx
@@ -232,7 +232,7 @@
           <a:p>
             <a:fld id="{82CAD2DE-6879-8E49-8DBA-44A5FDDC6440}" type="datetimeFigureOut">
               <a:rPr lang="en-US" smtClean="0"/>
-              <a:t>12/3/2017</a:t>
+              <a:t>12/3/17</a:t>
             </a:fld>
             <a:endParaRPr lang="en-US"/>
           </a:p>
@@ -1134,7 +1134,7 @@
               <a:pPr>
                 <a:defRPr/>
               </a:pPr>
-              <a:t>12/3/2017</a:t>
+              <a:t>12/3/17</a:t>
             </a:fld>
             <a:endParaRPr lang="en-US"/>
           </a:p>
@@ -1324,7 +1324,7 @@
               <a:pPr>
                 <a:defRPr/>
               </a:pPr>
-              <a:t>12/3/2017</a:t>
+              <a:t>12/3/17</a:t>
             </a:fld>
             <a:endParaRPr lang="en-US"/>
           </a:p>
@@ -1524,7 +1524,7 @@
               <a:pPr>
                 <a:defRPr/>
               </a:pPr>
-              <a:t>12/3/2017</a:t>
+              <a:t>12/3/17</a:t>
             </a:fld>
             <a:endParaRPr lang="en-US"/>
           </a:p>
@@ -1714,7 +1714,7 @@
               <a:pPr>
                 <a:defRPr/>
               </a:pPr>
-              <a:t>12/3/2017</a:t>
+              <a:t>12/3/17</a:t>
             </a:fld>
             <a:endParaRPr lang="en-US"/>
           </a:p>
@@ -1981,7 +1981,7 @@
               <a:pPr>
                 <a:defRPr/>
               </a:pPr>
-              <a:t>12/3/2017</a:t>
+              <a:t>12/3/17</a:t>
             </a:fld>
             <a:endParaRPr lang="en-US"/>
           </a:p>
@@ -2232,7 +2232,7 @@
               <a:pPr>
                 <a:defRPr/>
               </a:pPr>
-              <a:t>12/3/2017</a:t>
+              <a:t>12/3/17</a:t>
             </a:fld>
             <a:endParaRPr lang="en-US"/>
           </a:p>
@@ -2618,7 +2618,7 @@
               <a:pPr>
                 <a:defRPr/>
               </a:pPr>
-              <a:t>12/3/2017</a:t>
+              <a:t>12/3/17</a:t>
             </a:fld>
             <a:endParaRPr lang="en-US"/>
           </a:p>
@@ -2757,7 +2757,7 @@
               <a:pPr>
                 <a:defRPr/>
               </a:pPr>
-              <a:t>12/3/2017</a:t>
+              <a:t>12/3/17</a:t>
             </a:fld>
             <a:endParaRPr lang="en-US"/>
           </a:p>
@@ -2874,7 +2874,7 @@
               <a:pPr>
                 <a:defRPr/>
               </a:pPr>
-              <a:t>12/3/2017</a:t>
+              <a:t>12/3/17</a:t>
             </a:fld>
             <a:endParaRPr lang="en-US"/>
           </a:p>
@@ -3171,7 +3171,7 @@
               <a:pPr>
                 <a:defRPr/>
               </a:pPr>
-              <a:t>12/3/2017</a:t>
+              <a:t>12/3/17</a:t>
             </a:fld>
             <a:endParaRPr lang="en-US"/>
           </a:p>
@@ -3448,7 +3448,7 @@
               <a:pPr>
                 <a:defRPr/>
               </a:pPr>
-              <a:t>12/3/2017</a:t>
+              <a:t>12/3/17</a:t>
             </a:fld>
             <a:endParaRPr lang="en-US"/>
           </a:p>
@@ -3766,7 +3766,7 @@
               <a:pPr>
                 <a:defRPr/>
               </a:pPr>
-              <a:t>12/3/2017</a:t>
+              <a:t>12/3/17</a:t>
             </a:fld>
             <a:endParaRPr lang="en-US"/>
           </a:p>
@@ -4593,7 +4593,7 @@
           <p:cNvPr id="2" name="Picture 2">
             <a:extLst>
               <a:ext uri="{FF2B5EF4-FFF2-40B4-BE49-F238E27FC236}">
-                <a16:creationId xmlns:a16="http://schemas.microsoft.com/office/drawing/2014/main" id="{3B010912-C7FF-41D8-8AAB-4AEE892112FF}"/>
+                <a16:creationId xmlns:a16="http://schemas.microsoft.com/office/drawing/2014/main" xmlns="" id="{3B010912-C7FF-41D8-8AAB-4AEE892112FF}"/>
               </a:ext>
             </a:extLst>
           </p:cNvPr>
@@ -4719,7 +4719,7 @@
           <p:cNvPr id="2" name="Picture 2">
             <a:extLst>
               <a:ext uri="{FF2B5EF4-FFF2-40B4-BE49-F238E27FC236}">
-                <a16:creationId xmlns:a16="http://schemas.microsoft.com/office/drawing/2014/main" id="{4FDBEBB1-B0C0-43AC-8725-86144B3510E7}"/>
+                <a16:creationId xmlns:a16="http://schemas.microsoft.com/office/drawing/2014/main" xmlns="" id="{4FDBEBB1-B0C0-43AC-8725-86144B3510E7}"/>
               </a:ext>
             </a:extLst>
           </p:cNvPr>
@@ -4816,32 +4816,51 @@
           </a:p>
           <a:p>
             <a:r>
-              <a:rPr lang="en-US" altLang="en-US" dirty="0"/>
-              <a:t>Mix</a:t>
-            </a:r>
-          </a:p>
-          <a:p>
-            <a:r>
-              <a:rPr lang="en-US" altLang="en-US" dirty="0"/>
-              <a:t>Skim</a:t>
-            </a:r>
-          </a:p>
-          <a:p>
-            <a:r>
-              <a:rPr lang="en-US" altLang="en-US" dirty="0"/>
-              <a:t>Serve</a:t>
-            </a:r>
-          </a:p>
-          <a:p>
-            <a:r>
-              <a:rPr lang="en-US" altLang="en-US" dirty="0"/>
-              <a:t>Pack</a:t>
-            </a:r>
-          </a:p>
-          <a:p>
-            <a:r>
-              <a:rPr lang="en-US" altLang="en-US" dirty="0"/>
-              <a:t>Trash</a:t>
+              <a:rPr lang="en-US" altLang="en-US" dirty="0" smtClean="0"/>
+              <a:t>Mix		-Add</a:t>
+            </a:r>
+            <a:endParaRPr lang="en-US" altLang="en-US" dirty="0"/>
+          </a:p>
+          <a:p>
+            <a:r>
+              <a:rPr lang="en-US" altLang="en-US" dirty="0" smtClean="0"/>
+              <a:t>Skim	-Subtract</a:t>
+            </a:r>
+            <a:endParaRPr lang="en-US" altLang="en-US" dirty="0"/>
+          </a:p>
+          <a:p>
+            <a:r>
+              <a:rPr lang="en-US" altLang="en-US" dirty="0" smtClean="0"/>
+              <a:t>Serve	-Print</a:t>
+            </a:r>
+            <a:endParaRPr lang="en-US" altLang="en-US" dirty="0"/>
+          </a:p>
+          <a:p>
+            <a:r>
+              <a:rPr lang="en-US" altLang="en-US" dirty="0" smtClean="0"/>
+              <a:t>Pack		-Save A </a:t>
+            </a:r>
+            <a:r>
+              <a:rPr lang="en-US" altLang="en-US" dirty="0" err="1" smtClean="0"/>
+              <a:t>Var</a:t>
+            </a:r>
+            <a:endParaRPr lang="en-US" altLang="en-US" dirty="0"/>
+          </a:p>
+          <a:p>
+            <a:r>
+              <a:rPr lang="en-US" altLang="en-US" dirty="0" smtClean="0"/>
+              <a:t>Trash	-Delete A </a:t>
+            </a:r>
+            <a:r>
+              <a:rPr lang="en-US" altLang="en-US" dirty="0" err="1" smtClean="0"/>
+              <a:t>Var</a:t>
+            </a:r>
+            <a:endParaRPr lang="en-US" altLang="en-US" dirty="0"/>
+          </a:p>
+          <a:p>
+            <a:r>
+              <a:rPr lang="en-US" altLang="en-US" dirty="0" smtClean="0"/>
+              <a:t>And Much More!</a:t>
             </a:r>
           </a:p>
         </p:txBody>
@@ -4851,7 +4870,7 @@
           <p:cNvPr id="2" name="Picture 2">
             <a:extLst>
               <a:ext uri="{FF2B5EF4-FFF2-40B4-BE49-F238E27FC236}">
-                <a16:creationId xmlns:a16="http://schemas.microsoft.com/office/drawing/2014/main" id="{BFD8DDF8-2F47-4D7F-A4DC-1418FCF9082F}"/>
+                <a16:creationId xmlns:a16="http://schemas.microsoft.com/office/drawing/2014/main" xmlns="" id="{BFD8DDF8-2F47-4D7F-A4DC-1418FCF9082F}"/>
               </a:ext>
             </a:extLst>
           </p:cNvPr>
@@ -4962,7 +4981,7 @@
           <p:cNvPr id="2" name="Picture 2">
             <a:extLst>
               <a:ext uri="{FF2B5EF4-FFF2-40B4-BE49-F238E27FC236}">
-                <a16:creationId xmlns:a16="http://schemas.microsoft.com/office/drawing/2014/main" id="{42867FDB-D5A6-4A6B-AE91-40FE765BA7C0}"/>
+                <a16:creationId xmlns:a16="http://schemas.microsoft.com/office/drawing/2014/main" xmlns="" id="{42867FDB-D5A6-4A6B-AE91-40FE765BA7C0}"/>
               </a:ext>
             </a:extLst>
           </p:cNvPr>

</xml_diff>